<commit_message>
Moved Byte1 slides from 2017 branch to master.
</commit_message>
<xml_diff>
--- a/Lectures/Byte1 Fusion.pptx
+++ b/Lectures/Byte1 Fusion.pptx
@@ -5,10 +5,10 @@
     <p:sldMasterId id="2147483648" r:id="rId1"/>
   </p:sldMasterIdLst>
   <p:notesMasterIdLst>
-    <p:notesMasterId r:id="rId8"/>
+    <p:notesMasterId r:id="rId11"/>
   </p:notesMasterIdLst>
   <p:handoutMasterIdLst>
-    <p:handoutMasterId r:id="rId9"/>
+    <p:handoutMasterId r:id="rId12"/>
   </p:handoutMasterIdLst>
   <p:sldIdLst>
     <p:sldId id="256" r:id="rId2"/>
@@ -16,7 +16,10 @@
     <p:sldId id="315" r:id="rId4"/>
     <p:sldId id="316" r:id="rId5"/>
     <p:sldId id="304" r:id="rId6"/>
-    <p:sldId id="313" r:id="rId7"/>
+    <p:sldId id="317" r:id="rId7"/>
+    <p:sldId id="318" r:id="rId8"/>
+    <p:sldId id="319" r:id="rId9"/>
+    <p:sldId id="313" r:id="rId10"/>
   </p:sldIdLst>
   <p:sldSz cx="9144000" cy="6858000" type="screen4x3"/>
   <p:notesSz cx="6858000" cy="9144000"/>
@@ -115,6 +118,22 @@
       </a:defRPr>
     </a:lvl9pPr>
   </p:defaultTextStyle>
+  <p:extLst>
+    <p:ext uri="{EFAFB233-063F-42B5-8137-9DF3F51BA10A}">
+      <p15:sldGuideLst xmlns:p15="http://schemas.microsoft.com/office/powerpoint/2012/main">
+        <p15:guide id="1" orient="horz" pos="2160">
+          <p15:clr>
+            <a:srgbClr val="A4A3A4"/>
+          </p15:clr>
+        </p15:guide>
+        <p15:guide id="2" pos="583">
+          <p15:clr>
+            <a:srgbClr val="A4A3A4"/>
+          </p15:clr>
+        </p15:guide>
+      </p15:sldGuideLst>
+    </p:ext>
+  </p:extLst>
 </p:presentation>
 </file>
 
@@ -200,7 +219,7 @@
           <a:p>
             <a:fld id="{D3AAB66F-B1B7-D045-B4E8-4F60236F228D}" type="datetimeFigureOut">
               <a:rPr lang="en-US" smtClean="0"/>
-              <a:t>1/12/16</a:t>
+              <a:t>1/16/17</a:t>
             </a:fld>
             <a:endParaRPr lang="en-US"/>
           </a:p>
@@ -366,7 +385,7 @@
           <a:p>
             <a:fld id="{BCCF8E76-06A6-164E-A6FA-EC32C13EB232}" type="datetimeFigureOut">
               <a:rPr lang="en-US" smtClean="0"/>
-              <a:t>1/12/16</a:t>
+              <a:t>1/16/17</a:t>
             </a:fld>
             <a:endParaRPr lang="en-US"/>
           </a:p>
@@ -810,7 +829,7 @@
           <a:p>
             <a:fld id="{FD66F34B-9C4D-8640-BB34-4C24A79C9FFB}" type="slidenum">
               <a:rPr lang="en-US" smtClean="0"/>
-              <a:t>6</a:t>
+              <a:t>9</a:t>
             </a:fld>
             <a:endParaRPr lang="en-US"/>
           </a:p>
@@ -1346,7 +1365,7 @@
             <a:fld id="{FA3C144B-2939-9A49-B014-915EC3E81866}" type="datetime1">
               <a:rPr lang="en-US" smtClean="0"/>
               <a:pPr/>
-              <a:t>1/12/16</a:t>
+              <a:t>1/16/17</a:t>
             </a:fld>
             <a:endParaRPr lang="en-US" dirty="0"/>
           </a:p>
@@ -1775,7 +1794,7 @@
           <a:p>
             <a:fld id="{76838339-A875-5E45-AB3F-AAABD270346A}" type="datetime1">
               <a:rPr lang="en-US" smtClean="0"/>
-              <a:t>1/12/16</a:t>
+              <a:t>1/16/17</a:t>
             </a:fld>
             <a:endParaRPr lang="en-US"/>
           </a:p>
@@ -2061,7 +2080,7 @@
             <a:fld id="{FA3C144B-2939-9A49-B014-915EC3E81866}" type="datetime1">
               <a:rPr lang="en-US" smtClean="0"/>
               <a:pPr/>
-              <a:t>1/12/16</a:t>
+              <a:t>1/16/17</a:t>
             </a:fld>
             <a:endParaRPr lang="en-US" dirty="0"/>
           </a:p>
@@ -2543,7 +2562,7 @@
           <a:p>
             <a:fld id="{A73F672F-A5FB-5745-934A-1BF51CA5539C}" type="datetime1">
               <a:rPr lang="en-US" smtClean="0"/>
-              <a:t>1/12/16</a:t>
+              <a:t>1/16/17</a:t>
             </a:fld>
             <a:endParaRPr lang="en-US"/>
           </a:p>
@@ -2885,7 +2904,7 @@
             <a:fld id="{FA3C144B-2939-9A49-B014-915EC3E81866}" type="datetime1">
               <a:rPr lang="en-US" smtClean="0"/>
               <a:pPr/>
-              <a:t>1/12/16</a:t>
+              <a:t>1/16/17</a:t>
             </a:fld>
             <a:endParaRPr lang="en-US" dirty="0"/>
           </a:p>
@@ -3349,7 +3368,7 @@
           <a:p>
             <a:fld id="{6AFE6A63-5EBE-3E48-B0AE-DF655A1ECE76}" type="datetime1">
               <a:rPr lang="en-US" smtClean="0"/>
-              <a:t>1/12/16</a:t>
+              <a:t>1/16/17</a:t>
             </a:fld>
             <a:endParaRPr lang="en-US"/>
           </a:p>
@@ -3668,7 +3687,7 @@
           <a:p>
             <a:fld id="{4A019F0C-9D18-B54A-9AC9-18AA74EDB034}" type="datetime1">
               <a:rPr lang="en-US" smtClean="0"/>
-              <a:t>1/12/16</a:t>
+              <a:t>1/16/17</a:t>
             </a:fld>
             <a:endParaRPr lang="en-US"/>
           </a:p>
@@ -3978,7 +3997,7 @@
             <a:fld id="{FA3C144B-2939-9A49-B014-915EC3E81866}" type="datetime1">
               <a:rPr lang="en-US" smtClean="0"/>
               <a:pPr/>
-              <a:t>1/12/16</a:t>
+              <a:t>1/16/17</a:t>
             </a:fld>
             <a:endParaRPr lang="en-US" dirty="0"/>
           </a:p>
@@ -4241,7 +4260,7 @@
           <a:p>
             <a:fld id="{FA3C144B-2939-9A49-B014-915EC3E81866}" type="datetime1">
               <a:rPr lang="en-US" smtClean="0"/>
-              <a:t>1/12/16</a:t>
+              <a:t>1/16/17</a:t>
             </a:fld>
             <a:endParaRPr lang="en-US" dirty="0"/>
           </a:p>
@@ -4609,7 +4628,7 @@
           <a:p>
             <a:fld id="{7053BEFA-1175-F644-B249-7D41D72BD3FF}" type="datetime1">
               <a:rPr lang="en-US" smtClean="0"/>
-              <a:t>1/12/16</a:t>
+              <a:t>1/16/17</a:t>
             </a:fld>
             <a:endParaRPr lang="en-US"/>
           </a:p>
@@ -4728,7 +4747,7 @@
             <a:fld id="{FA3C144B-2939-9A49-B014-915EC3E81866}" type="datetime1">
               <a:rPr lang="en-US" smtClean="0"/>
               <a:pPr/>
-              <a:t>1/12/16</a:t>
+              <a:t>1/16/17</a:t>
             </a:fld>
             <a:endParaRPr lang="en-US" dirty="0"/>
           </a:p>
@@ -4945,7 +4964,7 @@
             <a:fld id="{FA3C144B-2939-9A49-B014-915EC3E81866}" type="datetime1">
               <a:rPr lang="en-US" smtClean="0"/>
               <a:pPr/>
-              <a:t>1/12/16</a:t>
+              <a:t>1/16/17</a:t>
             </a:fld>
             <a:endParaRPr lang="en-US" dirty="0"/>
           </a:p>
@@ -5190,7 +5209,7 @@
             <a:fld id="{FA3C144B-2939-9A49-B014-915EC3E81866}" type="datetime1">
               <a:rPr lang="en-US" smtClean="0"/>
               <a:pPr/>
-              <a:t>1/12/16</a:t>
+              <a:t>1/16/17</a:t>
             </a:fld>
             <a:endParaRPr lang="en-US" dirty="0"/>
           </a:p>
@@ -5568,7 +5587,7 @@
           <a:p>
             <a:fld id="{111EEF3B-ABF2-AA4E-9E24-0C6256942674}" type="datetime1">
               <a:rPr lang="en-US" smtClean="0"/>
-              <a:t>1/12/16</a:t>
+              <a:t>1/16/17</a:t>
             </a:fld>
             <a:endParaRPr lang="en-US"/>
           </a:p>
@@ -5732,7 +5751,7 @@
             <a:fld id="{FA3C144B-2939-9A49-B014-915EC3E81866}" type="datetime1">
               <a:rPr lang="en-US" smtClean="0"/>
               <a:pPr/>
-              <a:t>1/12/16</a:t>
+              <a:t>1/16/17</a:t>
             </a:fld>
             <a:endParaRPr lang="en-US" dirty="0"/>
           </a:p>
@@ -6149,7 +6168,7 @@
             <a:fld id="{FA3C144B-2939-9A49-B014-915EC3E81866}" type="datetime1">
               <a:rPr lang="en-US" smtClean="0"/>
               <a:pPr/>
-              <a:t>1/12/16</a:t>
+              <a:t>1/16/17</a:t>
             </a:fld>
             <a:endParaRPr lang="en-US" dirty="0"/>
           </a:p>
@@ -6465,7 +6484,7 @@
             <a:fld id="{FA3C144B-2939-9A49-B014-915EC3E81866}" type="datetime1">
               <a:rPr lang="en-US" smtClean="0"/>
               <a:pPr/>
-              <a:t>1/12/16</a:t>
+              <a:t>1/16/17</a:t>
             </a:fld>
             <a:endParaRPr lang="en-US" dirty="0"/>
           </a:p>
@@ -7131,7 +7150,7 @@
             <a:fld id="{FA3C144B-2939-9A49-B014-915EC3E81866}" type="datetime1">
               <a:rPr lang="en-US" smtClean="0"/>
               <a:pPr/>
-              <a:t>1/12/16</a:t>
+              <a:t>1/16/17</a:t>
             </a:fld>
             <a:endParaRPr lang="en-US" dirty="0"/>
           </a:p>
@@ -7416,7 +7435,7 @@
           <a:effectLst/>
           <a:extLst>
             <a:ext uri="{91240B29-F687-4f45-9708-019B960494DF}">
-              <a14:hiddenLine xmlns:a14="http://schemas.microsoft.com/office/drawing/2010/main" w="9525">
+              <a14:hiddenLine xmlns:a14="http://schemas.microsoft.com/office/drawing/2010/main" xmlns="" w="9525">
                 <a:solidFill>
                   <a:srgbClr val="000000"/>
                 </a:solidFill>
@@ -7426,7 +7445,7 @@
               </a14:hiddenLine>
             </a:ext>
             <a:ext uri="{AF507438-7753-43e0-B8FC-AC1667EBCBE1}">
-              <a14:hiddenEffects xmlns:a14="http://schemas.microsoft.com/office/drawing/2010/main">
+              <a14:hiddenEffects xmlns:a14="http://schemas.microsoft.com/office/drawing/2010/main" xmlns="">
                 <a:effectLst>
                   <a:outerShdw blurRad="40000" dist="23000" dir="5400000" rotWithShape="0">
                     <a:srgbClr val="000000">
@@ -7526,7 +7545,7 @@
   <p:timing>
     <p:tnLst>
       <p:par>
-        <p:cTn xmlns:p14="http://schemas.microsoft.com/office/powerpoint/2010/main" id="1" dur="indefinite" restart="never" nodeType="tmRoot"/>
+        <p:cTn id="1" dur="indefinite" restart="never" nodeType="tmRoot"/>
       </p:par>
     </p:tnLst>
   </p:timing>
@@ -8127,7 +8146,7 @@
           <a:effectLst/>
           <a:extLst>
             <a:ext uri="{91240B29-F687-4f45-9708-019B960494DF}">
-              <a14:hiddenLine xmlns:a14="http://schemas.microsoft.com/office/drawing/2010/main" w="9525">
+              <a14:hiddenLine xmlns:a14="http://schemas.microsoft.com/office/drawing/2010/main" xmlns="" w="9525">
                 <a:solidFill>
                   <a:srgbClr val="000000"/>
                 </a:solidFill>
@@ -8137,7 +8156,7 @@
               </a14:hiddenLine>
             </a:ext>
             <a:ext uri="{AF507438-7753-43e0-B8FC-AC1667EBCBE1}">
-              <a14:hiddenEffects xmlns:a14="http://schemas.microsoft.com/office/drawing/2010/main">
+              <a14:hiddenEffects xmlns:a14="http://schemas.microsoft.com/office/drawing/2010/main" xmlns="">
                 <a:effectLst>
                   <a:outerShdw blurRad="40000" dist="23000" dir="5400000" rotWithShape="0">
                     <a:srgbClr val="000000">
@@ -8174,7 +8193,7 @@
   <p:timing>
     <p:tnLst>
       <p:par>
-        <p:cTn xmlns:p14="http://schemas.microsoft.com/office/powerpoint/2010/main" id="1" dur="indefinite" restart="never" nodeType="tmRoot"/>
+        <p:cTn id="1" dur="indefinite" restart="never" nodeType="tmRoot"/>
       </p:par>
     </p:tnLst>
   </p:timing>
@@ -8334,7 +8353,7 @@
           <a:p>
             <a:fld id="{7053BEFA-1175-F644-B249-7D41D72BD3FF}" type="datetime1">
               <a:rPr lang="en-US" smtClean="0"/>
-              <a:t>1/12/16</a:t>
+              <a:t>1/16/17</a:t>
             </a:fld>
             <a:endParaRPr lang="en-US"/>
           </a:p>
@@ -8425,7 +8444,7 @@
   <p:timing>
     <p:tnLst>
       <p:par>
-        <p:cTn xmlns:p14="http://schemas.microsoft.com/office/powerpoint/2010/main" id="1" dur="indefinite" restart="never" nodeType="tmRoot"/>
+        <p:cTn id="1" dur="indefinite" restart="never" nodeType="tmRoot"/>
       </p:par>
     </p:tnLst>
   </p:timing>
@@ -8523,7 +8542,7 @@
           <a:p>
             <a:fld id="{7053BEFA-1175-F644-B249-7D41D72BD3FF}" type="datetime1">
               <a:rPr lang="en-US" smtClean="0"/>
-              <a:t>1/12/16</a:t>
+              <a:t>1/16/17</a:t>
             </a:fld>
             <a:endParaRPr lang="en-US"/>
           </a:p>
@@ -8614,7 +8633,7 @@
   <p:timing>
     <p:tnLst>
       <p:par>
-        <p:cTn xmlns:p14="http://schemas.microsoft.com/office/powerpoint/2010/main" id="1" dur="indefinite" restart="never" nodeType="tmRoot"/>
+        <p:cTn id="1" dur="indefinite" restart="never" nodeType="tmRoot"/>
       </p:par>
     </p:tnLst>
   </p:timing>
@@ -8712,7 +8731,7 @@
           <a:p>
             <a:fld id="{7053BEFA-1175-F644-B249-7D41D72BD3FF}" type="datetime1">
               <a:rPr lang="en-US" smtClean="0"/>
-              <a:t>1/12/16</a:t>
+              <a:t>1/16/17</a:t>
             </a:fld>
             <a:endParaRPr lang="en-US"/>
           </a:p>
@@ -8803,7 +8822,7 @@
   <p:timing>
     <p:tnLst>
       <p:par>
-        <p:cTn xmlns:p14="http://schemas.microsoft.com/office/powerpoint/2010/main" id="1" dur="indefinite" restart="never" nodeType="tmRoot"/>
+        <p:cTn id="1" dur="indefinite" restart="never" nodeType="tmRoot"/>
       </p:par>
     </p:tnLst>
   </p:timing>
@@ -8862,9 +8881,74 @@
           </a:p>
         </p:txBody>
       </p:sp>
+      <p:sp>
+        <p:nvSpPr>
+          <p:cNvPr id="4" name="Date Placeholder 3"/>
+          <p:cNvSpPr>
+            <a:spLocks noGrp="1"/>
+          </p:cNvSpPr>
+          <p:nvPr>
+            <p:ph type="dt" sz="half" idx="10"/>
+          </p:nvPr>
+        </p:nvSpPr>
+        <p:spPr/>
+        <p:txBody>
+          <a:bodyPr/>
+          <a:lstStyle/>
+          <a:p>
+            <a:fld id="{7053BEFA-1175-F644-B249-7D41D72BD3FF}" type="datetime1">
+              <a:rPr lang="en-US" smtClean="0"/>
+              <a:t>1/16/17</a:t>
+            </a:fld>
+            <a:endParaRPr lang="en-US"/>
+          </a:p>
+        </p:txBody>
+      </p:sp>
+      <p:sp>
+        <p:nvSpPr>
+          <p:cNvPr id="5" name="Footer Placeholder 4"/>
+          <p:cNvSpPr>
+            <a:spLocks noGrp="1"/>
+          </p:cNvSpPr>
+          <p:nvPr>
+            <p:ph type="ftr" sz="quarter" idx="11"/>
+          </p:nvPr>
+        </p:nvSpPr>
+        <p:spPr/>
+        <p:txBody>
+          <a:bodyPr/>
+          <a:lstStyle/>
+          <a:p>
+            <a:endParaRPr lang="en-US" dirty="0"/>
+          </a:p>
+        </p:txBody>
+      </p:sp>
+      <p:sp>
+        <p:nvSpPr>
+          <p:cNvPr id="6" name="Slide Number Placeholder 5"/>
+          <p:cNvSpPr>
+            <a:spLocks noGrp="1"/>
+          </p:cNvSpPr>
+          <p:nvPr>
+            <p:ph type="sldNum" sz="quarter" idx="12"/>
+          </p:nvPr>
+        </p:nvSpPr>
+        <p:spPr/>
+        <p:txBody>
+          <a:bodyPr/>
+          <a:lstStyle/>
+          <a:p>
+            <a:fld id="{17E276FA-8F89-B34D-A726-BE3FA1F8DD97}" type="slidenum">
+              <a:rPr lang="en-US" smtClean="0"/>
+              <a:t>5</a:t>
+            </a:fld>
+            <a:endParaRPr lang="en-US" dirty="0"/>
+          </a:p>
+        </p:txBody>
+      </p:sp>
       <p:pic>
         <p:nvPicPr>
-          <p:cNvPr id="7" name="Content Placeholder 6" descr="Screen Shot 2014-01-06 at 6.04.53 PM.png"/>
+          <p:cNvPr id="8" name="Content Placeholder 7"/>
           <p:cNvPicPr>
             <a:picLocks noGrp="1" noChangeAspect="1"/>
           </p:cNvPicPr>
@@ -8880,78 +8964,17 @@
               </a:ext>
             </a:extLst>
           </a:blip>
-          <a:srcRect l="334" r="334"/>
           <a:stretch>
             <a:fillRect/>
           </a:stretch>
         </p:blipFill>
-        <p:spPr/>
+        <p:spPr>
+          <a:xfrm>
+            <a:off x="1128713" y="2311752"/>
+            <a:ext cx="7048500" cy="3452108"/>
+          </a:xfrm>
+        </p:spPr>
       </p:pic>
-      <p:sp>
-        <p:nvSpPr>
-          <p:cNvPr id="4" name="Date Placeholder 3"/>
-          <p:cNvSpPr>
-            <a:spLocks noGrp="1"/>
-          </p:cNvSpPr>
-          <p:nvPr>
-            <p:ph type="dt" sz="half" idx="10"/>
-          </p:nvPr>
-        </p:nvSpPr>
-        <p:spPr/>
-        <p:txBody>
-          <a:bodyPr/>
-          <a:lstStyle/>
-          <a:p>
-            <a:fld id="{7053BEFA-1175-F644-B249-7D41D72BD3FF}" type="datetime1">
-              <a:rPr lang="en-US" smtClean="0"/>
-              <a:t>1/12/16</a:t>
-            </a:fld>
-            <a:endParaRPr lang="en-US"/>
-          </a:p>
-        </p:txBody>
-      </p:sp>
-      <p:sp>
-        <p:nvSpPr>
-          <p:cNvPr id="5" name="Footer Placeholder 4"/>
-          <p:cNvSpPr>
-            <a:spLocks noGrp="1"/>
-          </p:cNvSpPr>
-          <p:nvPr>
-            <p:ph type="ftr" sz="quarter" idx="11"/>
-          </p:nvPr>
-        </p:nvSpPr>
-        <p:spPr/>
-        <p:txBody>
-          <a:bodyPr/>
-          <a:lstStyle/>
-          <a:p>
-            <a:endParaRPr lang="en-US" dirty="0"/>
-          </a:p>
-        </p:txBody>
-      </p:sp>
-      <p:sp>
-        <p:nvSpPr>
-          <p:cNvPr id="6" name="Slide Number Placeholder 5"/>
-          <p:cNvSpPr>
-            <a:spLocks noGrp="1"/>
-          </p:cNvSpPr>
-          <p:nvPr>
-            <p:ph type="sldNum" sz="quarter" idx="12"/>
-          </p:nvPr>
-        </p:nvSpPr>
-        <p:spPr/>
-        <p:txBody>
-          <a:bodyPr/>
-          <a:lstStyle/>
-          <a:p>
-            <a:fld id="{17E276FA-8F89-B34D-A726-BE3FA1F8DD97}" type="slidenum">
-              <a:rPr lang="en-US" smtClean="0"/>
-              <a:t>5</a:t>
-            </a:fld>
-            <a:endParaRPr lang="en-US" dirty="0"/>
-          </a:p>
-        </p:txBody>
-      </p:sp>
     </p:spTree>
     <p:extLst>
       <p:ext uri="{BB962C8B-B14F-4D97-AF65-F5344CB8AC3E}">
@@ -8965,7 +8988,7 @@
   <p:timing>
     <p:tnLst>
       <p:par>
-        <p:cTn xmlns:p14="http://schemas.microsoft.com/office/powerpoint/2010/main" id="1" dur="indefinite" restart="never" nodeType="tmRoot"/>
+        <p:cTn id="1" dur="indefinite" restart="never" nodeType="tmRoot"/>
       </p:par>
     </p:tnLst>
   </p:timing>
@@ -9006,6 +9029,763 @@
           <a:p>
             <a:r>
               <a:rPr lang="en-US" dirty="0" smtClean="0"/>
+              <a:t>How does </a:t>
+            </a:r>
+            <a:r>
+              <a:rPr lang="en-US" dirty="0" err="1" smtClean="0"/>
+              <a:t>Appspot</a:t>
+            </a:r>
+            <a:r>
+              <a:rPr lang="en-US" smtClean="0"/>
+              <a:t> work</a:t>
+            </a:r>
+            <a:r>
+              <a:rPr lang="en-US" dirty="0" smtClean="0"/>
+              <a:t>?</a:t>
+            </a:r>
+            <a:endParaRPr lang="en-US" dirty="0"/>
+          </a:p>
+        </p:txBody>
+      </p:sp>
+      <p:sp>
+        <p:nvSpPr>
+          <p:cNvPr id="4" name="Date Placeholder 3"/>
+          <p:cNvSpPr>
+            <a:spLocks noGrp="1"/>
+          </p:cNvSpPr>
+          <p:nvPr>
+            <p:ph type="dt" sz="half" idx="10"/>
+          </p:nvPr>
+        </p:nvSpPr>
+        <p:spPr/>
+        <p:txBody>
+          <a:bodyPr/>
+          <a:lstStyle/>
+          <a:p>
+            <a:fld id="{7053BEFA-1175-F644-B249-7D41D72BD3FF}" type="datetime1">
+              <a:rPr lang="en-US" smtClean="0"/>
+              <a:t>1/16/17</a:t>
+            </a:fld>
+            <a:endParaRPr lang="en-US"/>
+          </a:p>
+        </p:txBody>
+      </p:sp>
+      <p:sp>
+        <p:nvSpPr>
+          <p:cNvPr id="5" name="Footer Placeholder 4"/>
+          <p:cNvSpPr>
+            <a:spLocks noGrp="1"/>
+          </p:cNvSpPr>
+          <p:nvPr>
+            <p:ph type="ftr" sz="quarter" idx="11"/>
+          </p:nvPr>
+        </p:nvSpPr>
+        <p:spPr/>
+        <p:txBody>
+          <a:bodyPr/>
+          <a:lstStyle/>
+          <a:p>
+            <a:endParaRPr lang="en-US" dirty="0"/>
+          </a:p>
+        </p:txBody>
+      </p:sp>
+      <p:sp>
+        <p:nvSpPr>
+          <p:cNvPr id="6" name="Slide Number Placeholder 5"/>
+          <p:cNvSpPr>
+            <a:spLocks noGrp="1"/>
+          </p:cNvSpPr>
+          <p:nvPr>
+            <p:ph type="sldNum" sz="quarter" idx="12"/>
+          </p:nvPr>
+        </p:nvSpPr>
+        <p:spPr/>
+        <p:txBody>
+          <a:bodyPr/>
+          <a:lstStyle/>
+          <a:p>
+            <a:fld id="{17E276FA-8F89-B34D-A726-BE3FA1F8DD97}" type="slidenum">
+              <a:rPr lang="en-US" smtClean="0"/>
+              <a:t>6</a:t>
+            </a:fld>
+            <a:endParaRPr lang="en-US" dirty="0"/>
+          </a:p>
+        </p:txBody>
+      </p:sp>
+      <p:pic>
+        <p:nvPicPr>
+          <p:cNvPr id="8" name="Content Placeholder 7"/>
+          <p:cNvPicPr>
+            <a:picLocks noGrp="1" noChangeAspect="1"/>
+          </p:cNvPicPr>
+          <p:nvPr>
+            <p:ph idx="1"/>
+          </p:nvPr>
+        </p:nvPicPr>
+        <p:blipFill>
+          <a:blip r:embed="rId2">
+            <a:extLst>
+              <a:ext uri="{28A0092B-C50C-407E-A947-70E740481C1C}">
+                <a14:useLocalDpi xmlns:a14="http://schemas.microsoft.com/office/drawing/2010/main" val="0"/>
+              </a:ext>
+            </a:extLst>
+          </a:blip>
+          <a:stretch>
+            <a:fillRect/>
+          </a:stretch>
+        </p:blipFill>
+        <p:spPr>
+          <a:xfrm>
+            <a:off x="1128713" y="2311752"/>
+            <a:ext cx="7048500" cy="3452108"/>
+          </a:xfrm>
+        </p:spPr>
+      </p:pic>
+      <p:sp>
+        <p:nvSpPr>
+          <p:cNvPr id="3" name="Rectangle 2"/>
+          <p:cNvSpPr/>
+          <p:nvPr/>
+        </p:nvSpPr>
+        <p:spPr>
+          <a:xfrm>
+            <a:off x="954132" y="2069432"/>
+            <a:ext cx="1476247" cy="794084"/>
+          </a:xfrm>
+          <a:prstGeom prst="rect">
+            <a:avLst/>
+          </a:prstGeom>
+          <a:noFill/>
+        </p:spPr>
+        <p:style>
+          <a:lnRef idx="2">
+            <a:schemeClr val="accent1"/>
+          </a:lnRef>
+          <a:fillRef idx="1">
+            <a:schemeClr val="lt1"/>
+          </a:fillRef>
+          <a:effectRef idx="0">
+            <a:schemeClr val="accent1"/>
+          </a:effectRef>
+          <a:fontRef idx="minor">
+            <a:schemeClr val="dk1"/>
+          </a:fontRef>
+        </p:style>
+        <p:txBody>
+          <a:bodyPr rtlCol="0" anchor="ctr"/>
+          <a:lstStyle/>
+          <a:p>
+            <a:pPr algn="ctr"/>
+            <a:endParaRPr lang="en-US"/>
+          </a:p>
+        </p:txBody>
+      </p:sp>
+    </p:spTree>
+    <p:extLst>
+      <p:ext uri="{BB962C8B-B14F-4D97-AF65-F5344CB8AC3E}">
+        <p14:creationId xmlns:p14="http://schemas.microsoft.com/office/powerpoint/2010/main" val="1227803560"/>
+      </p:ext>
+    </p:extLst>
+  </p:cSld>
+  <p:clrMapOvr>
+    <a:masterClrMapping/>
+  </p:clrMapOvr>
+  <p:timing>
+    <p:tnLst>
+      <p:par>
+        <p:cTn id="1" dur="indefinite" restart="never" nodeType="tmRoot"/>
+      </p:par>
+    </p:tnLst>
+  </p:timing>
+</p:sld>
+</file>
+
+<file path=ppt/slides/slide7.xml><?xml version="1.0" encoding="utf-8"?>
+<p:sld xmlns:a="http://schemas.openxmlformats.org/drawingml/2006/main" xmlns:r="http://schemas.openxmlformats.org/officeDocument/2006/relationships" xmlns:p="http://schemas.openxmlformats.org/presentationml/2006/main">
+  <p:cSld>
+    <p:spTree>
+      <p:nvGrpSpPr>
+        <p:cNvPr id="1" name=""/>
+        <p:cNvGrpSpPr/>
+        <p:nvPr/>
+      </p:nvGrpSpPr>
+      <p:grpSpPr>
+        <a:xfrm>
+          <a:off x="0" y="0"/>
+          <a:ext cx="0" cy="0"/>
+          <a:chOff x="0" y="0"/>
+          <a:chExt cx="0" cy="0"/>
+        </a:xfrm>
+      </p:grpSpPr>
+      <p:sp>
+        <p:nvSpPr>
+          <p:cNvPr id="2" name="Title 1"/>
+          <p:cNvSpPr>
+            <a:spLocks noGrp="1"/>
+          </p:cNvSpPr>
+          <p:nvPr>
+            <p:ph type="title"/>
+          </p:nvPr>
+        </p:nvSpPr>
+        <p:spPr/>
+        <p:txBody>
+          <a:bodyPr/>
+          <a:lstStyle/>
+          <a:p>
+            <a:r>
+              <a:rPr lang="en-US" dirty="0" smtClean="0"/>
+              <a:t>How does </a:t>
+            </a:r>
+            <a:r>
+              <a:rPr lang="en-US" dirty="0" err="1" smtClean="0"/>
+              <a:t>Appspot</a:t>
+            </a:r>
+            <a:r>
+              <a:rPr lang="en-US" smtClean="0"/>
+              <a:t> work</a:t>
+            </a:r>
+            <a:r>
+              <a:rPr lang="en-US" dirty="0" smtClean="0"/>
+              <a:t>?</a:t>
+            </a:r>
+            <a:endParaRPr lang="en-US" dirty="0"/>
+          </a:p>
+        </p:txBody>
+      </p:sp>
+      <p:sp>
+        <p:nvSpPr>
+          <p:cNvPr id="4" name="Date Placeholder 3"/>
+          <p:cNvSpPr>
+            <a:spLocks noGrp="1"/>
+          </p:cNvSpPr>
+          <p:nvPr>
+            <p:ph type="dt" sz="half" idx="10"/>
+          </p:nvPr>
+        </p:nvSpPr>
+        <p:spPr/>
+        <p:txBody>
+          <a:bodyPr/>
+          <a:lstStyle/>
+          <a:p>
+            <a:fld id="{7053BEFA-1175-F644-B249-7D41D72BD3FF}" type="datetime1">
+              <a:rPr lang="en-US" smtClean="0"/>
+              <a:t>1/16/17</a:t>
+            </a:fld>
+            <a:endParaRPr lang="en-US"/>
+          </a:p>
+        </p:txBody>
+      </p:sp>
+      <p:sp>
+        <p:nvSpPr>
+          <p:cNvPr id="5" name="Footer Placeholder 4"/>
+          <p:cNvSpPr>
+            <a:spLocks noGrp="1"/>
+          </p:cNvSpPr>
+          <p:nvPr>
+            <p:ph type="ftr" sz="quarter" idx="11"/>
+          </p:nvPr>
+        </p:nvSpPr>
+        <p:spPr/>
+        <p:txBody>
+          <a:bodyPr/>
+          <a:lstStyle/>
+          <a:p>
+            <a:endParaRPr lang="en-US" dirty="0"/>
+          </a:p>
+        </p:txBody>
+      </p:sp>
+      <p:sp>
+        <p:nvSpPr>
+          <p:cNvPr id="6" name="Slide Number Placeholder 5"/>
+          <p:cNvSpPr>
+            <a:spLocks noGrp="1"/>
+          </p:cNvSpPr>
+          <p:nvPr>
+            <p:ph type="sldNum" sz="quarter" idx="12"/>
+          </p:nvPr>
+        </p:nvSpPr>
+        <p:spPr/>
+        <p:txBody>
+          <a:bodyPr/>
+          <a:lstStyle/>
+          <a:p>
+            <a:fld id="{17E276FA-8F89-B34D-A726-BE3FA1F8DD97}" type="slidenum">
+              <a:rPr lang="en-US" smtClean="0"/>
+              <a:t>7</a:t>
+            </a:fld>
+            <a:endParaRPr lang="en-US" dirty="0"/>
+          </a:p>
+        </p:txBody>
+      </p:sp>
+      <p:pic>
+        <p:nvPicPr>
+          <p:cNvPr id="8" name="Content Placeholder 7"/>
+          <p:cNvPicPr>
+            <a:picLocks noGrp="1" noChangeAspect="1"/>
+          </p:cNvPicPr>
+          <p:nvPr>
+            <p:ph idx="1"/>
+          </p:nvPr>
+        </p:nvPicPr>
+        <p:blipFill>
+          <a:blip r:embed="rId2">
+            <a:extLst>
+              <a:ext uri="{28A0092B-C50C-407E-A947-70E740481C1C}">
+                <a14:useLocalDpi xmlns:a14="http://schemas.microsoft.com/office/drawing/2010/main" val="0"/>
+              </a:ext>
+            </a:extLst>
+          </a:blip>
+          <a:stretch>
+            <a:fillRect/>
+          </a:stretch>
+        </p:blipFill>
+        <p:spPr>
+          <a:xfrm>
+            <a:off x="1128713" y="2311752"/>
+            <a:ext cx="7048500" cy="3452108"/>
+          </a:xfrm>
+        </p:spPr>
+      </p:pic>
+      <p:sp>
+        <p:nvSpPr>
+          <p:cNvPr id="3" name="Rectangle 2"/>
+          <p:cNvSpPr/>
+          <p:nvPr/>
+        </p:nvSpPr>
+        <p:spPr>
+          <a:xfrm>
+            <a:off x="954132" y="4037806"/>
+            <a:ext cx="1476247" cy="794084"/>
+          </a:xfrm>
+          <a:prstGeom prst="rect">
+            <a:avLst/>
+          </a:prstGeom>
+          <a:noFill/>
+        </p:spPr>
+        <p:style>
+          <a:lnRef idx="2">
+            <a:schemeClr val="accent1"/>
+          </a:lnRef>
+          <a:fillRef idx="1">
+            <a:schemeClr val="lt1"/>
+          </a:fillRef>
+          <a:effectRef idx="0">
+            <a:schemeClr val="accent1"/>
+          </a:effectRef>
+          <a:fontRef idx="minor">
+            <a:schemeClr val="dk1"/>
+          </a:fontRef>
+        </p:style>
+        <p:txBody>
+          <a:bodyPr rtlCol="0" anchor="ctr"/>
+          <a:lstStyle/>
+          <a:p>
+            <a:pPr algn="ctr"/>
+            <a:endParaRPr lang="en-US"/>
+          </a:p>
+        </p:txBody>
+      </p:sp>
+    </p:spTree>
+    <p:extLst>
+      <p:ext uri="{BB962C8B-B14F-4D97-AF65-F5344CB8AC3E}">
+        <p14:creationId xmlns:p14="http://schemas.microsoft.com/office/powerpoint/2010/main" val="1195515532"/>
+      </p:ext>
+    </p:extLst>
+  </p:cSld>
+  <p:clrMapOvr>
+    <a:masterClrMapping/>
+  </p:clrMapOvr>
+  <p:timing>
+    <p:tnLst>
+      <p:par>
+        <p:cTn id="1" dur="indefinite" restart="never" nodeType="tmRoot"/>
+      </p:par>
+    </p:tnLst>
+  </p:timing>
+</p:sld>
+</file>
+
+<file path=ppt/slides/slide8.xml><?xml version="1.0" encoding="utf-8"?>
+<p:sld xmlns:a="http://schemas.openxmlformats.org/drawingml/2006/main" xmlns:r="http://schemas.openxmlformats.org/officeDocument/2006/relationships" xmlns:p="http://schemas.openxmlformats.org/presentationml/2006/main">
+  <p:cSld>
+    <p:spTree>
+      <p:nvGrpSpPr>
+        <p:cNvPr id="1" name=""/>
+        <p:cNvGrpSpPr/>
+        <p:nvPr/>
+      </p:nvGrpSpPr>
+      <p:grpSpPr>
+        <a:xfrm>
+          <a:off x="0" y="0"/>
+          <a:ext cx="0" cy="0"/>
+          <a:chOff x="0" y="0"/>
+          <a:chExt cx="0" cy="0"/>
+        </a:xfrm>
+      </p:grpSpPr>
+      <p:sp>
+        <p:nvSpPr>
+          <p:cNvPr id="2" name="Title 1"/>
+          <p:cNvSpPr>
+            <a:spLocks noGrp="1"/>
+          </p:cNvSpPr>
+          <p:nvPr>
+            <p:ph type="title"/>
+          </p:nvPr>
+        </p:nvSpPr>
+        <p:spPr/>
+        <p:txBody>
+          <a:bodyPr/>
+          <a:lstStyle/>
+          <a:p>
+            <a:r>
+              <a:rPr lang="en-US" dirty="0" smtClean="0"/>
+              <a:t>Key commands</a:t>
+            </a:r>
+            <a:endParaRPr lang="en-US" dirty="0"/>
+          </a:p>
+        </p:txBody>
+      </p:sp>
+      <p:sp>
+        <p:nvSpPr>
+          <p:cNvPr id="3" name="Content Placeholder 2"/>
+          <p:cNvSpPr>
+            <a:spLocks noGrp="1"/>
+          </p:cNvSpPr>
+          <p:nvPr>
+            <p:ph idx="1"/>
+          </p:nvPr>
+        </p:nvSpPr>
+        <p:spPr/>
+        <p:txBody>
+          <a:bodyPr/>
+          <a:lstStyle/>
+          <a:p>
+            <a:r>
+              <a:rPr lang="en-US" dirty="0" err="1"/>
+              <a:t>gcloud</a:t>
+            </a:r>
+            <a:r>
+              <a:rPr lang="en-US" dirty="0"/>
+              <a:t> source repos </a:t>
+            </a:r>
+            <a:r>
+              <a:rPr lang="en-US" dirty="0" smtClean="0"/>
+              <a:t>clone </a:t>
+            </a:r>
+            <a:r>
+              <a:rPr lang="en-US" dirty="0"/>
+              <a:t>python-</a:t>
+            </a:r>
+            <a:r>
+              <a:rPr lang="en-US" dirty="0" err="1"/>
+              <a:t>gae</a:t>
+            </a:r>
+            <a:r>
+              <a:rPr lang="en-US" dirty="0"/>
+              <a:t>-</a:t>
+            </a:r>
+            <a:r>
+              <a:rPr lang="en-US" dirty="0" err="1"/>
+              <a:t>quickstart</a:t>
+            </a:r>
+            <a:r>
+              <a:rPr lang="en-US" dirty="0"/>
+              <a:t> --</a:t>
+            </a:r>
+            <a:r>
+              <a:rPr lang="en-US" dirty="0" smtClean="0"/>
+              <a:t>project=jmankoff-fusion2017</a:t>
+            </a:r>
+          </a:p>
+          <a:p>
+            <a:pPr lvl="1"/>
+            <a:r>
+              <a:rPr lang="en-US" dirty="0" smtClean="0"/>
+              <a:t>Checks out the base code for this assignment </a:t>
+            </a:r>
+            <a:br>
+              <a:rPr lang="en-US" dirty="0" smtClean="0"/>
+            </a:br>
+            <a:r>
+              <a:rPr lang="en-US" dirty="0" smtClean="0"/>
+              <a:t>which google provides)</a:t>
+            </a:r>
+          </a:p>
+          <a:p>
+            <a:r>
+              <a:rPr lang="en-US" dirty="0" err="1"/>
+              <a:t>dev_appserver.py</a:t>
+            </a:r>
+            <a:r>
+              <a:rPr lang="en-US" dirty="0"/>
+              <a:t> ./</a:t>
+            </a:r>
+            <a:r>
+              <a:rPr lang="en-US" dirty="0" err="1" smtClean="0"/>
+              <a:t>app.yaml</a:t>
+            </a:r>
+            <a:endParaRPr lang="en-US" dirty="0" smtClean="0"/>
+          </a:p>
+          <a:p>
+            <a:pPr lvl="1"/>
+            <a:r>
+              <a:rPr lang="en-US" dirty="0" smtClean="0"/>
+              <a:t>For web preview </a:t>
+            </a:r>
+          </a:p>
+          <a:p>
+            <a:r>
+              <a:rPr lang="en-US" dirty="0" err="1"/>
+              <a:t>gcloud</a:t>
+            </a:r>
+            <a:r>
+              <a:rPr lang="en-US" dirty="0"/>
+              <a:t> app deploy ./</a:t>
+            </a:r>
+            <a:r>
+              <a:rPr lang="en-US" dirty="0" err="1"/>
+              <a:t>index.yaml</a:t>
+            </a:r>
+            <a:r>
+              <a:rPr lang="en-US" dirty="0"/>
+              <a:t> ./</a:t>
+            </a:r>
+            <a:r>
+              <a:rPr lang="en-US" dirty="0" err="1" smtClean="0"/>
+              <a:t>app.yaml</a:t>
+            </a:r>
+            <a:endParaRPr lang="en-US" dirty="0" smtClean="0"/>
+          </a:p>
+          <a:p>
+            <a:pPr lvl="1"/>
+            <a:r>
+              <a:rPr lang="en-US" dirty="0" smtClean="0"/>
+              <a:t>For </a:t>
+            </a:r>
+            <a:r>
+              <a:rPr lang="en-US" dirty="0" err="1" smtClean="0"/>
+              <a:t>handin</a:t>
+            </a:r>
+            <a:r>
+              <a:rPr lang="en-US" dirty="0" smtClean="0"/>
+              <a:t> ([</a:t>
+            </a:r>
+            <a:r>
+              <a:rPr lang="en-US" dirty="0" err="1" smtClean="0"/>
+              <a:t>yourbytename</a:t>
+            </a:r>
+            <a:r>
+              <a:rPr lang="en-US" dirty="0" smtClean="0"/>
+              <a:t>].</a:t>
+            </a:r>
+            <a:r>
+              <a:rPr lang="en-US" dirty="0" err="1" smtClean="0"/>
+              <a:t>appspot.com</a:t>
+            </a:r>
+            <a:r>
+              <a:rPr lang="en-US" dirty="0" smtClean="0"/>
+              <a:t>)</a:t>
+            </a:r>
+          </a:p>
+          <a:p>
+            <a:endParaRPr lang="en-US" dirty="0"/>
+          </a:p>
+        </p:txBody>
+      </p:sp>
+      <p:sp>
+        <p:nvSpPr>
+          <p:cNvPr id="4" name="Date Placeholder 3"/>
+          <p:cNvSpPr>
+            <a:spLocks noGrp="1"/>
+          </p:cNvSpPr>
+          <p:nvPr>
+            <p:ph type="dt" sz="half" idx="10"/>
+          </p:nvPr>
+        </p:nvSpPr>
+        <p:spPr/>
+        <p:txBody>
+          <a:bodyPr/>
+          <a:lstStyle/>
+          <a:p>
+            <a:fld id="{7053BEFA-1175-F644-B249-7D41D72BD3FF}" type="datetime1">
+              <a:rPr lang="en-US" smtClean="0"/>
+              <a:t>1/16/17</a:t>
+            </a:fld>
+            <a:endParaRPr lang="en-US"/>
+          </a:p>
+        </p:txBody>
+      </p:sp>
+      <p:sp>
+        <p:nvSpPr>
+          <p:cNvPr id="5" name="Footer Placeholder 4"/>
+          <p:cNvSpPr>
+            <a:spLocks noGrp="1"/>
+          </p:cNvSpPr>
+          <p:nvPr>
+            <p:ph type="ftr" sz="quarter" idx="11"/>
+          </p:nvPr>
+        </p:nvSpPr>
+        <p:spPr/>
+        <p:txBody>
+          <a:bodyPr/>
+          <a:lstStyle/>
+          <a:p>
+            <a:endParaRPr lang="en-US" dirty="0"/>
+          </a:p>
+        </p:txBody>
+      </p:sp>
+      <p:sp>
+        <p:nvSpPr>
+          <p:cNvPr id="6" name="Slide Number Placeholder 5"/>
+          <p:cNvSpPr>
+            <a:spLocks noGrp="1"/>
+          </p:cNvSpPr>
+          <p:nvPr>
+            <p:ph type="sldNum" sz="quarter" idx="12"/>
+          </p:nvPr>
+        </p:nvSpPr>
+        <p:spPr/>
+        <p:txBody>
+          <a:bodyPr/>
+          <a:lstStyle/>
+          <a:p>
+            <a:fld id="{17E276FA-8F89-B34D-A726-BE3FA1F8DD97}" type="slidenum">
+              <a:rPr lang="en-US" smtClean="0"/>
+              <a:t>8</a:t>
+            </a:fld>
+            <a:endParaRPr lang="en-US" dirty="0"/>
+          </a:p>
+        </p:txBody>
+      </p:sp>
+      <p:pic>
+        <p:nvPicPr>
+          <p:cNvPr id="1026" name="Picture 2" descr="eb Preview Button"/>
+          <p:cNvPicPr>
+            <a:picLocks noChangeAspect="1" noChangeArrowheads="1"/>
+          </p:cNvPicPr>
+          <p:nvPr/>
+        </p:nvPicPr>
+        <p:blipFill>
+          <a:blip r:embed="rId2">
+            <a:extLst>
+              <a:ext uri="{28A0092B-C50C-407E-A947-70E740481C1C}">
+                <a14:useLocalDpi xmlns:a14="http://schemas.microsoft.com/office/drawing/2010/main" val="0"/>
+              </a:ext>
+            </a:extLst>
+          </a:blip>
+          <a:srcRect/>
+          <a:stretch>
+            <a:fillRect/>
+          </a:stretch>
+        </p:blipFill>
+        <p:spPr bwMode="auto">
+          <a:xfrm>
+            <a:off x="0" y="0"/>
+            <a:ext cx="171450" cy="171450"/>
+          </a:xfrm>
+          <a:prstGeom prst="rect">
+            <a:avLst/>
+          </a:prstGeom>
+          <a:noFill/>
+          <a:extLst>
+            <a:ext uri="{909E8E84-426E-40DD-AFC4-6F175D3DCCD1}">
+              <a14:hiddenFill xmlns:a14="http://schemas.microsoft.com/office/drawing/2010/main">
+                <a:solidFill>
+                  <a:srgbClr val="FFFFFF"/>
+                </a:solidFill>
+              </a14:hiddenFill>
+            </a:ext>
+          </a:extLst>
+        </p:spPr>
+      </p:pic>
+      <p:pic>
+        <p:nvPicPr>
+          <p:cNvPr id="1028" name="Picture 4" descr="eb Preview Button"/>
+          <p:cNvPicPr>
+            <a:picLocks noChangeAspect="1" noChangeArrowheads="1"/>
+          </p:cNvPicPr>
+          <p:nvPr/>
+        </p:nvPicPr>
+        <p:blipFill>
+          <a:blip r:embed="rId2">
+            <a:extLst>
+              <a:ext uri="{28A0092B-C50C-407E-A947-70E740481C1C}">
+                <a14:useLocalDpi xmlns:a14="http://schemas.microsoft.com/office/drawing/2010/main" val="0"/>
+              </a:ext>
+            </a:extLst>
+          </a:blip>
+          <a:srcRect/>
+          <a:stretch>
+            <a:fillRect/>
+          </a:stretch>
+        </p:blipFill>
+        <p:spPr bwMode="auto">
+          <a:xfrm>
+            <a:off x="3714375" y="4037141"/>
+            <a:ext cx="607496" cy="607496"/>
+          </a:xfrm>
+          <a:prstGeom prst="rect">
+            <a:avLst/>
+          </a:prstGeom>
+          <a:noFill/>
+          <a:extLst>
+            <a:ext uri="{909E8E84-426E-40DD-AFC4-6F175D3DCCD1}">
+              <a14:hiddenFill xmlns:a14="http://schemas.microsoft.com/office/drawing/2010/main">
+                <a:solidFill>
+                  <a:srgbClr val="FFFFFF"/>
+                </a:solidFill>
+              </a14:hiddenFill>
+            </a:ext>
+          </a:extLst>
+        </p:spPr>
+      </p:pic>
+    </p:spTree>
+    <p:extLst>
+      <p:ext uri="{BB962C8B-B14F-4D97-AF65-F5344CB8AC3E}">
+        <p14:creationId xmlns:p14="http://schemas.microsoft.com/office/powerpoint/2010/main" val="415311650"/>
+      </p:ext>
+    </p:extLst>
+  </p:cSld>
+  <p:clrMapOvr>
+    <a:masterClrMapping/>
+  </p:clrMapOvr>
+</p:sld>
+</file>
+
+<file path=ppt/slides/slide9.xml><?xml version="1.0" encoding="utf-8"?>
+<p:sld xmlns:a="http://schemas.openxmlformats.org/drawingml/2006/main" xmlns:r="http://schemas.openxmlformats.org/officeDocument/2006/relationships" xmlns:p="http://schemas.openxmlformats.org/presentationml/2006/main">
+  <p:cSld>
+    <p:spTree>
+      <p:nvGrpSpPr>
+        <p:cNvPr id="1" name=""/>
+        <p:cNvGrpSpPr/>
+        <p:nvPr/>
+      </p:nvGrpSpPr>
+      <p:grpSpPr>
+        <a:xfrm>
+          <a:off x="0" y="0"/>
+          <a:ext cx="0" cy="0"/>
+          <a:chOff x="0" y="0"/>
+          <a:chExt cx="0" cy="0"/>
+        </a:xfrm>
+      </p:grpSpPr>
+      <p:sp>
+        <p:nvSpPr>
+          <p:cNvPr id="2" name="Title 1"/>
+          <p:cNvSpPr>
+            <a:spLocks noGrp="1"/>
+          </p:cNvSpPr>
+          <p:nvPr>
+            <p:ph type="title"/>
+          </p:nvPr>
+        </p:nvSpPr>
+        <p:spPr/>
+        <p:txBody>
+          <a:bodyPr/>
+          <a:lstStyle/>
+          <a:p>
+            <a:r>
+              <a:rPr lang="en-US" dirty="0" smtClean="0"/>
               <a:t>Hints and Requests</a:t>
             </a:r>
             <a:endParaRPr lang="en-US" dirty="0"/>
@@ -9030,7 +9810,7 @@
             <a:fld id="{FA3C144B-2939-9A49-B014-915EC3E81866}" type="datetime1">
               <a:rPr lang="en-US" smtClean="0"/>
               <a:pPr/>
-              <a:t>1/12/16</a:t>
+              <a:t>1/16/17</a:t>
             </a:fld>
             <a:endParaRPr lang="en-US" dirty="0"/>
           </a:p>
@@ -9073,7 +9853,7 @@
             <a:fld id="{17E276FA-8F89-B34D-A726-BE3FA1F8DD97}" type="slidenum">
               <a:rPr lang="en-US" smtClean="0"/>
               <a:pPr/>
-              <a:t>6</a:t>
+              <a:t>9</a:t>
             </a:fld>
             <a:endParaRPr lang="en-US" dirty="0"/>
           </a:p>
@@ -9101,7 +9881,15 @@
           <a:p>
             <a:r>
               <a:rPr lang="en-US" dirty="0" smtClean="0"/>
-              <a:t>Be sure to follow the tutorial step by step. </a:t>
+              <a:t>Be sure to follow the </a:t>
+            </a:r>
+            <a:r>
+              <a:rPr lang="en-US" dirty="0" smtClean="0"/>
+              <a:t>tutorials </a:t>
+            </a:r>
+            <a:r>
+              <a:rPr lang="en-US" dirty="0" smtClean="0"/>
+              <a:t>step by step. </a:t>
             </a:r>
           </a:p>
           <a:p>
@@ -9119,13 +9907,8 @@
           <a:p>
             <a:r>
               <a:rPr lang="en-US" dirty="0" smtClean="0"/>
-              <a:t>Most of your time should be spent working on your data and what question you are answering </a:t>
-            </a:r>
-            <a:r>
-              <a:rPr lang="en-US" smtClean="0"/>
-              <a:t>with it</a:t>
-            </a:r>
-            <a:endParaRPr lang="en-US" dirty="0" smtClean="0"/>
+              <a:t>Most of your time should be spent working on your data and what question you are answering with it</a:t>
+            </a:r>
           </a:p>
         </p:txBody>
       </p:sp>
@@ -9142,7 +9925,7 @@
   <p:timing>
     <p:tnLst>
       <p:par>
-        <p:cTn xmlns:p14="http://schemas.microsoft.com/office/powerpoint/2010/main" id="1" dur="indefinite" restart="never" nodeType="tmRoot"/>
+        <p:cTn id="1" dur="indefinite" restart="never" nodeType="tmRoot"/>
       </p:par>
     </p:tnLst>
   </p:timing>

</xml_diff>